<commit_message>
Make some corrections to the presentation
</commit_message>
<xml_diff>
--- a/AkronAshevillePresentation.pptx
+++ b/AkronAshevillePresentation.pptx
@@ -3480,6 +3480,12 @@
               <a:t>95% confidence</a:t>
             </a:r>
           </a:p>
+          <a:p>
+            <a:r>
+              <a:rPr lang="en-US" sz="2400" dirty="0"/>
+              <a:t>Two sample z test used.</a:t>
+            </a:r>
+          </a:p>
         </p:txBody>
       </p:sp>
     </p:spTree>
@@ -3558,8 +3564,8 @@
         </p:nvSpPr>
         <p:spPr>
           <a:xfrm>
-            <a:off x="2231136" y="2638044"/>
-            <a:ext cx="7729728" cy="4077562"/>
+            <a:off x="1712575" y="2638044"/>
+            <a:ext cx="9678939" cy="4077562"/>
           </a:xfrm>
         </p:spPr>
         <p:txBody>
@@ -3589,6 +3595,12 @@
             <a:r>
               <a:rPr lang="en-US" sz="2400" dirty="0"/>
               <a:t>Test statistic: z = -0.090892</a:t>
+            </a:r>
+          </a:p>
+          <a:p>
+            <a:r>
+              <a:rPr lang="en-US" sz="2400" dirty="0"/>
+              <a:t>Lower-tailed test</a:t>
             </a:r>
           </a:p>
           <a:p>
@@ -5030,7 +5042,7 @@
           <p:nvPr>
             <p:extLst>
               <p:ext uri="{D42A27DB-BD31-4B8C-83A1-F6EECF244321}">
-                <p14:modId xmlns:p14="http://schemas.microsoft.com/office/powerpoint/2010/main" val="2190263381"/>
+                <p14:modId xmlns:p14="http://schemas.microsoft.com/office/powerpoint/2010/main" val="3330133355"/>
               </p:ext>
             </p:extLst>
           </p:nvPr>
@@ -6203,8 +6215,8 @@
         </p:blipFill>
         <p:spPr>
           <a:xfrm>
-            <a:off x="33438" y="3017519"/>
-            <a:ext cx="6059533" cy="3216064"/>
+            <a:off x="33438" y="3017518"/>
+            <a:ext cx="6059533" cy="3840481"/>
           </a:xfrm>
           <a:prstGeom prst="rect">
             <a:avLst/>
@@ -6234,7 +6246,7 @@
         <p:spPr>
           <a:xfrm>
             <a:off x="6099029" y="3017519"/>
-            <a:ext cx="6059535" cy="3216064"/>
+            <a:ext cx="6059535" cy="3840480"/>
           </a:xfrm>
           <a:prstGeom prst="rect">
             <a:avLst/>
@@ -6454,6 +6466,12 @@
             </a:r>
           </a:p>
           <a:p>
+            <a:r>
+              <a:rPr lang="en-US" sz="2400" dirty="0"/>
+              <a:t>Two sample z test used.</a:t>
+            </a:r>
+          </a:p>
+          <a:p>
             <a:endParaRPr lang="en-US" dirty="0"/>
           </a:p>
         </p:txBody>
@@ -6535,7 +6553,7 @@
         <p:spPr>
           <a:xfrm>
             <a:off x="523875" y="2638044"/>
-            <a:ext cx="11128375" cy="3101983"/>
+            <a:ext cx="11128375" cy="4019835"/>
           </a:xfrm>
         </p:spPr>
         <p:txBody>
@@ -6572,21 +6590,19 @@
           <a:p>
             <a:r>
               <a:rPr lang="en-US" sz="2400" dirty="0"/>
+              <a:t>Lower-tailed test</a:t>
+            </a:r>
+          </a:p>
+          <a:p>
+            <a:r>
+              <a:rPr lang="en-US" sz="2400" dirty="0"/>
               <a:t>-2.530 &lt; -1.645</a:t>
             </a:r>
           </a:p>
           <a:p>
             <a:r>
               <a:rPr lang="en-US" sz="2400" dirty="0"/>
-              <a:t>Reject null hypothesis, Asheville winter average temperature </a:t>
-            </a:r>
-            <a:r>
-              <a:rPr lang="en-US" sz="2400"/>
-              <a:t>greater than </a:t>
-            </a:r>
-            <a:r>
-              <a:rPr lang="en-US" sz="2400" dirty="0"/>
-              <a:t>8 degrees warmer than Akron’s winter average temperature</a:t>
+              <a:t>Reject null hypothesis, Asheville winter average temperature greater than 8 degrees warmer than Akron’s winter average temperature</a:t>
             </a:r>
           </a:p>
           <a:p>
@@ -6691,6 +6707,12 @@
             </a:r>
           </a:p>
           <a:p>
+            <a:r>
+              <a:rPr lang="en-US" sz="2400" dirty="0"/>
+              <a:t>Two sample z test used.</a:t>
+            </a:r>
+          </a:p>
+          <a:p>
             <a:endParaRPr lang="en-US" dirty="0"/>
           </a:p>
         </p:txBody>
@@ -6777,7 +6799,7 @@
         </p:spPr>
         <p:txBody>
           <a:bodyPr>
-            <a:normAutofit/>
+            <a:normAutofit lnSpcReduction="10000"/>
           </a:bodyPr>
           <a:lstStyle/>
           <a:p>
@@ -6804,6 +6826,12 @@
             <a:r>
               <a:rPr lang="en-US" sz="2400" dirty="0"/>
               <a:t>Test statistic: z = 3.551</a:t>
+            </a:r>
+          </a:p>
+          <a:p>
+            <a:r>
+              <a:rPr lang="en-US" sz="2400" dirty="0"/>
+              <a:t>Upper-tailed test</a:t>
             </a:r>
           </a:p>
           <a:p>
@@ -6899,8 +6927,8 @@
         </p:nvSpPr>
         <p:spPr>
           <a:xfrm>
-            <a:off x="2231136" y="2638044"/>
-            <a:ext cx="7729728" cy="3727831"/>
+            <a:off x="1443181" y="2638044"/>
+            <a:ext cx="9409545" cy="4039077"/>
           </a:xfrm>
         </p:spPr>
         <p:txBody>
@@ -6911,7 +6939,15 @@
           <a:p>
             <a:r>
               <a:rPr lang="en-US" sz="2400" dirty="0"/>
-              <a:t>When looking at the entire year temperature, then we are not able to make on conclusions about the temperature difference between Akron, OH and Asheville, NC</a:t>
+              <a:t>When looking at the </a:t>
+            </a:r>
+            <a:r>
+              <a:rPr lang="en-US" sz="2400"/>
+              <a:t>entire year, </a:t>
+            </a:r>
+            <a:r>
+              <a:rPr lang="en-US" sz="2400" dirty="0"/>
+              <a:t>then we are not able to make on conclusions about the temperature difference between Akron, OH and Asheville, NC</a:t>
             </a:r>
           </a:p>
           <a:p>
@@ -7258,13 +7294,8 @@
             <a:pPr algn="l"/>
             <a:r>
               <a:rPr lang="en-US" sz="2600" dirty="0"/>
-              <a:t>Amazing </a:t>
-            </a:r>
-            <a:r>
-              <a:rPr lang="en-US" sz="2600" dirty="0" err="1"/>
-              <a:t>Pubcycle</a:t>
-            </a:r>
-            <a:endParaRPr lang="en-US" sz="2600" dirty="0"/>
+              <a:t>Amazing PubCycle</a:t>
+            </a:r>
           </a:p>
           <a:p>
             <a:pPr algn="l"/>

</xml_diff>

<commit_message>
Updated charts in report and presentation
</commit_message>
<xml_diff>
--- a/AkronAshevillePresentation.pptx
+++ b/AkronAshevillePresentation.pptx
@@ -18,7 +18,7 @@
     <p:sldId id="265" r:id="rId12"/>
     <p:sldId id="266" r:id="rId13"/>
     <p:sldId id="273" r:id="rId14"/>
-    <p:sldId id="275" r:id="rId15"/>
+    <p:sldId id="281" r:id="rId15"/>
     <p:sldId id="267" r:id="rId16"/>
     <p:sldId id="268" r:id="rId17"/>
     <p:sldId id="276" r:id="rId18"/>
@@ -3735,14 +3735,16 @@
       </p:sp>
       <p:pic>
         <p:nvPicPr>
-          <p:cNvPr id="8" name="Picture 7">
+          <p:cNvPr id="3" name="Picture 2">
             <a:extLst>
               <a:ext uri="{FF2B5EF4-FFF2-40B4-BE49-F238E27FC236}">
-                <a16:creationId xmlns:a16="http://schemas.microsoft.com/office/drawing/2014/main" id="{47758B81-337D-124F-9282-901A5367D0B1}"/>
+                <a16:creationId xmlns:a16="http://schemas.microsoft.com/office/drawing/2014/main" id="{22DB79F1-30A2-784C-BB94-08B9EB26926F}"/>
               </a:ext>
             </a:extLst>
           </p:cNvPr>
-          <p:cNvPicPr/>
+          <p:cNvPicPr>
+            <a:picLocks noChangeAspect="1"/>
+          </p:cNvPicPr>
           <p:nvPr/>
         </p:nvPicPr>
         <p:blipFill>
@@ -3753,8 +3755,8 @@
         </p:blipFill>
         <p:spPr>
           <a:xfrm>
-            <a:off x="3103562" y="2317749"/>
-            <a:ext cx="5984875" cy="4206875"/>
+            <a:off x="2817133" y="2309091"/>
+            <a:ext cx="6557734" cy="4548909"/>
           </a:xfrm>
           <a:prstGeom prst="rect">
             <a:avLst/>
@@ -3764,7 +3766,7 @@
     </p:spTree>
     <p:extLst>
       <p:ext uri="{BB962C8B-B14F-4D97-AF65-F5344CB8AC3E}">
-        <p14:creationId xmlns:p14="http://schemas.microsoft.com/office/powerpoint/2010/main" val="2310364287"/>
+        <p14:creationId xmlns:p14="http://schemas.microsoft.com/office/powerpoint/2010/main" val="2351094302"/>
       </p:ext>
     </p:extLst>
   </p:cSld>
@@ -3821,14 +3823,16 @@
       </p:sp>
       <p:pic>
         <p:nvPicPr>
-          <p:cNvPr id="6" name="Picture 5">
+          <p:cNvPr id="4" name="Picture 3">
             <a:extLst>
               <a:ext uri="{FF2B5EF4-FFF2-40B4-BE49-F238E27FC236}">
-                <a16:creationId xmlns:a16="http://schemas.microsoft.com/office/drawing/2014/main" id="{7CEEB106-49EB-D24A-9076-ADA70762A4D7}"/>
+                <a16:creationId xmlns:a16="http://schemas.microsoft.com/office/drawing/2014/main" id="{5507C0E4-C2D0-2443-B71D-4F60E5A3201E}"/>
               </a:ext>
             </a:extLst>
           </p:cNvPr>
-          <p:cNvPicPr/>
+          <p:cNvPicPr>
+            <a:picLocks noChangeAspect="1"/>
+          </p:cNvPicPr>
           <p:nvPr/>
         </p:nvPicPr>
         <p:blipFill>
@@ -3839,8 +3843,8 @@
         </p:blipFill>
         <p:spPr>
           <a:xfrm>
-            <a:off x="0" y="2286000"/>
-            <a:ext cx="12192000" cy="4572000"/>
+            <a:off x="1810595" y="2309091"/>
+            <a:ext cx="8570810" cy="4548909"/>
           </a:xfrm>
           <a:prstGeom prst="rect">
             <a:avLst/>
@@ -9286,14 +9290,16 @@
       </p:sp>
       <p:pic>
         <p:nvPicPr>
-          <p:cNvPr id="8" name="Picture 7">
+          <p:cNvPr id="3" name="Picture 2">
             <a:extLst>
               <a:ext uri="{FF2B5EF4-FFF2-40B4-BE49-F238E27FC236}">
-                <a16:creationId xmlns:a16="http://schemas.microsoft.com/office/drawing/2014/main" id="{47758B81-337D-124F-9282-901A5367D0B1}"/>
+                <a16:creationId xmlns:a16="http://schemas.microsoft.com/office/drawing/2014/main" id="{22DB79F1-30A2-784C-BB94-08B9EB26926F}"/>
               </a:ext>
             </a:extLst>
           </p:cNvPr>
-          <p:cNvPicPr/>
+          <p:cNvPicPr>
+            <a:picLocks noChangeAspect="1"/>
+          </p:cNvPicPr>
           <p:nvPr/>
         </p:nvPicPr>
         <p:blipFill>
@@ -9304,8 +9310,8 @@
         </p:blipFill>
         <p:spPr>
           <a:xfrm>
-            <a:off x="3103562" y="2317749"/>
-            <a:ext cx="5984875" cy="4206875"/>
+            <a:off x="2817133" y="2309091"/>
+            <a:ext cx="6557734" cy="4548909"/>
           </a:xfrm>
           <a:prstGeom prst="rect">
             <a:avLst/>

</xml_diff>

<commit_message>
Fixed grammar errors in presentation
</commit_message>
<xml_diff>
--- a/AkronAshevillePresentation.pptx
+++ b/AkronAshevillePresentation.pptx
@@ -294,7 +294,7 @@
           <a:p>
             <a:fld id="{1160EA64-D806-43AC-9DF2-F8C432F32B4C}" type="datetimeFigureOut">
               <a:rPr lang="en-US" dirty="0"/>
-              <a:t>12/2/18</a:t>
+              <a:t>12/3/18</a:t>
             </a:fld>
             <a:endParaRPr lang="en-US" dirty="0"/>
           </a:p>
@@ -460,7 +460,7 @@
           <a:p>
             <a:fld id="{E9F9C37B-1D36-470B-8223-D6C91242EC14}" type="datetimeFigureOut">
               <a:rPr lang="en-US" dirty="0"/>
-              <a:t>12/2/18</a:t>
+              <a:t>12/3/18</a:t>
             </a:fld>
             <a:endParaRPr lang="en-US" dirty="0"/>
           </a:p>
@@ -635,7 +635,7 @@
           <a:p>
             <a:fld id="{67C6F52A-A82B-47A2-A83A-8C4C91F2D59F}" type="datetimeFigureOut">
               <a:rPr lang="en-US" dirty="0"/>
-              <a:t>12/2/18</a:t>
+              <a:t>12/3/18</a:t>
             </a:fld>
             <a:endParaRPr lang="en-US" dirty="0"/>
           </a:p>
@@ -800,7 +800,7 @@
           <a:p>
             <a:fld id="{F070A7B3-6521-4DCA-87E5-044747A908C1}" type="datetimeFigureOut">
               <a:rPr lang="en-US" dirty="0"/>
-              <a:t>12/2/18</a:t>
+              <a:t>12/3/18</a:t>
             </a:fld>
             <a:endParaRPr lang="en-US" dirty="0"/>
           </a:p>
@@ -1064,7 +1064,7 @@
           <a:p>
             <a:fld id="{1160EA64-D806-43AC-9DF2-F8C432F32B4C}" type="datetimeFigureOut">
               <a:rPr lang="en-US" dirty="0"/>
-              <a:t>12/2/18</a:t>
+              <a:t>12/3/18</a:t>
             </a:fld>
             <a:endParaRPr lang="en-US" dirty="0"/>
           </a:p>
@@ -1292,7 +1292,7 @@
           <a:p>
             <a:fld id="{AB134690-1557-4C89-A502-4959FE7FAD70}" type="datetimeFigureOut">
               <a:rPr lang="en-US" dirty="0"/>
-              <a:t>12/2/18</a:t>
+              <a:t>12/3/18</a:t>
             </a:fld>
             <a:endParaRPr lang="en-US" dirty="0"/>
           </a:p>
@@ -1646,7 +1646,7 @@
           <a:p>
             <a:fld id="{4F7D4976-E339-4826-83B7-FBD03F55ECF8}" type="datetimeFigureOut">
               <a:rPr lang="en-US" dirty="0"/>
-              <a:t>12/2/18</a:t>
+              <a:t>12/3/18</a:t>
             </a:fld>
             <a:endParaRPr lang="en-US" dirty="0"/>
           </a:p>
@@ -1782,7 +1782,7 @@
           <a:p>
             <a:fld id="{E1037C31-9E7A-4F99-8774-A0E530DE1A42}" type="datetimeFigureOut">
               <a:rPr lang="en-US" dirty="0"/>
-              <a:t>12/2/18</a:t>
+              <a:t>12/3/18</a:t>
             </a:fld>
             <a:endParaRPr lang="en-US" dirty="0"/>
           </a:p>
@@ -1872,7 +1872,7 @@
           <a:p>
             <a:fld id="{C278504F-A551-4DE0-9316-4DCD1D8CC752}" type="datetimeFigureOut">
               <a:rPr lang="en-US" dirty="0"/>
-              <a:t>12/2/18</a:t>
+              <a:t>12/3/18</a:t>
             </a:fld>
             <a:endParaRPr lang="en-US" dirty="0"/>
           </a:p>
@@ -2224,7 +2224,7 @@
           <a:p>
             <a:fld id="{D1BE4249-C0D0-4B06-8692-E8BB871AF643}" type="datetimeFigureOut">
               <a:rPr lang="en-US" dirty="0"/>
-              <a:t>12/2/18</a:t>
+              <a:t>12/3/18</a:t>
             </a:fld>
             <a:endParaRPr lang="en-US" dirty="0"/>
           </a:p>
@@ -2576,7 +2576,7 @@
           <a:p>
             <a:fld id="{042B0DB6-F5C7-45FB-8CF3-31B45F9C2DAC}" type="datetimeFigureOut">
               <a:rPr lang="en-US" dirty="0"/>
-              <a:t>12/2/18</a:t>
+              <a:t>12/3/18</a:t>
             </a:fld>
             <a:endParaRPr lang="en-US" dirty="0"/>
           </a:p>
@@ -2812,7 +2812,7 @@
           <a:p>
             <a:fld id="{1160EA64-D806-43AC-9DF2-F8C432F32B4C}" type="datetimeFigureOut">
               <a:rPr lang="en-US" dirty="0"/>
-              <a:t>12/2/18</a:t>
+              <a:t>12/3/18</a:t>
             </a:fld>
             <a:endParaRPr lang="en-US" dirty="0"/>
           </a:p>
@@ -3465,25 +3465,19 @@
           <a:p>
             <a:r>
               <a:rPr lang="en-US" sz="2400" dirty="0"/>
-              <a:t>Two sample Z test</a:t>
+              <a:t>Two sample Z test was used.</a:t>
             </a:r>
           </a:p>
           <a:p>
             <a:r>
               <a:rPr lang="en-US" sz="2400" dirty="0"/>
-              <a:t>Population distribution unknown, but because sample size is large can assume normal by central limit theorem</a:t>
+              <a:t>Population distribution unknown, but because sample size is large can assume normal by central limit theorem.</a:t>
             </a:r>
           </a:p>
           <a:p>
             <a:r>
               <a:rPr lang="en-US" sz="2400" dirty="0"/>
-              <a:t>95% confidence</a:t>
-            </a:r>
-          </a:p>
-          <a:p>
-            <a:r>
-              <a:rPr lang="en-US" sz="2400" dirty="0"/>
-              <a:t>Two sample z test used.</a:t>
+              <a:t>95% confidence.</a:t>
             </a:r>
           </a:p>
         </p:txBody>
@@ -6454,25 +6448,19 @@
           <a:p>
             <a:r>
               <a:rPr lang="en-US" sz="2400" dirty="0"/>
-              <a:t>Two sample Z test</a:t>
+              <a:t>Two sample Z test was used.</a:t>
             </a:r>
           </a:p>
           <a:p>
             <a:r>
               <a:rPr lang="en-US" sz="2400" dirty="0"/>
-              <a:t>Population distribution unknown, but because sample size is large can assume normal by central limit theorem</a:t>
+              <a:t>Population distribution unknown, but because sample size is large can assume normal by central limit theorem.</a:t>
             </a:r>
           </a:p>
           <a:p>
             <a:r>
               <a:rPr lang="en-US" sz="2400" dirty="0"/>
-              <a:t>95% confidence</a:t>
-            </a:r>
-          </a:p>
-          <a:p>
-            <a:r>
-              <a:rPr lang="en-US" sz="2400" dirty="0"/>
-              <a:t>Two sample z test used.</a:t>
+              <a:t>95% confidence.</a:t>
             </a:r>
           </a:p>
           <a:p>
@@ -6695,25 +6683,19 @@
           <a:p>
             <a:r>
               <a:rPr lang="en-US" sz="2400" dirty="0"/>
-              <a:t>Two sample Z test</a:t>
+              <a:t>Two sample Z test was used.</a:t>
             </a:r>
           </a:p>
           <a:p>
             <a:r>
               <a:rPr lang="en-US" sz="2400" dirty="0"/>
-              <a:t>Population distribution unknown, but because sample size is large can assume normal by central limit theorem</a:t>
+              <a:t>Population distribution unknown, but because sample size is large can assume normal by central limit theorem.</a:t>
             </a:r>
           </a:p>
           <a:p>
             <a:r>
               <a:rPr lang="en-US" sz="2400" dirty="0"/>
-              <a:t>95% confidence</a:t>
-            </a:r>
-          </a:p>
-          <a:p>
-            <a:r>
-              <a:rPr lang="en-US" sz="2400" dirty="0"/>
-              <a:t>Two sample z test used.</a:t>
+              <a:t>95% confidence.</a:t>
             </a:r>
           </a:p>
           <a:p>
@@ -6803,7 +6785,7 @@
         </p:spPr>
         <p:txBody>
           <a:bodyPr>
-            <a:normAutofit lnSpcReduction="10000"/>
+            <a:normAutofit fontScale="92500"/>
           </a:bodyPr>
           <a:lstStyle/>
           <a:p>
@@ -6817,13 +6799,13 @@
             </a:r>
             <a:r>
               <a:rPr lang="en-US" sz="2400" dirty="0"/>
-              <a:t>:  Akron winter average temperature – Asheville winter average temperature = -2</a:t>
+              <a:t>:  Akron summer average temperature – Asheville summer average temperature = -2</a:t>
             </a:r>
           </a:p>
           <a:p>
             <a:r>
               <a:rPr lang="en-US" sz="2400" dirty="0"/>
-              <a:t>Ha:  Akron winter average temperature – Asheville winter average temperature &gt; -2</a:t>
+              <a:t>Ha:  Akron summer average temperature – Asheville summer average temperature &gt; -2</a:t>
             </a:r>
           </a:p>
           <a:p>
@@ -6847,7 +6829,7 @@
           <a:p>
             <a:r>
               <a:rPr lang="en-US" sz="2400" dirty="0"/>
-              <a:t>Reject null hypothesis, Asheville summer average temperature less than 2 degrees warmer than Akron’s winter average temperature</a:t>
+              <a:t>Reject null hypothesis, Asheville summer average temperature less than 2 degrees warmer than Akron’s summer average temperature</a:t>
             </a:r>
           </a:p>
           <a:p>
@@ -7277,7 +7259,7 @@
             <a:pPr algn="l"/>
             <a:r>
               <a:rPr lang="en-US" sz="2600" dirty="0"/>
-              <a:t>Located in north east North Carolina.</a:t>
+              <a:t>Located in northeast North Carolina.</a:t>
             </a:r>
           </a:p>
           <a:p>

</xml_diff>